<commit_message>
Adding Code for feature selection
</commit_message>
<xml_diff>
--- a/Documentation/Presentation.pptx
+++ b/Documentation/Presentation.pptx
@@ -5543,237 +5543,6 @@
           </a:p>
         </p:txBody>
       </p:sp>
-      <p:pic>
-        <p:nvPicPr>
-          <p:cNvPr id="4108" name="Picture 12" descr="Image result for network symbol png">
-            <a:extLst>
-              <a:ext uri="{FF2B5EF4-FFF2-40B4-BE49-F238E27FC236}">
-                <a16:creationId xmlns:a16="http://schemas.microsoft.com/office/drawing/2014/main" id="{742DE90A-8EB3-46B4-A533-CFA3370062C1}"/>
-              </a:ext>
-            </a:extLst>
-          </p:cNvPr>
-          <p:cNvPicPr>
-            <a:picLocks noChangeAspect="1" noChangeArrowheads="1"/>
-          </p:cNvPicPr>
-          <p:nvPr/>
-        </p:nvPicPr>
-        <p:blipFill>
-          <a:blip r:embed="rId2">
-            <a:duotone>
-              <a:schemeClr val="bg2">
-                <a:shade val="45000"/>
-                <a:satMod val="135000"/>
-              </a:schemeClr>
-              <a:prstClr val="white"/>
-            </a:duotone>
-            <a:extLst>
-              <a:ext uri="{28A0092B-C50C-407E-A947-70E740481C1C}">
-                <a14:useLocalDpi xmlns:a14="http://schemas.microsoft.com/office/drawing/2010/main" val="0"/>
-              </a:ext>
-            </a:extLst>
-          </a:blip>
-          <a:srcRect/>
-          <a:stretch>
-            <a:fillRect/>
-          </a:stretch>
-        </p:blipFill>
-        <p:spPr bwMode="auto">
-          <a:xfrm>
-            <a:off x="253084" y="4314548"/>
-            <a:ext cx="2506126" cy="2506126"/>
-          </a:xfrm>
-          <a:prstGeom prst="rect">
-            <a:avLst/>
-          </a:prstGeom>
-          <a:noFill/>
-          <a:extLst>
-            <a:ext uri="{909E8E84-426E-40DD-AFC4-6F175D3DCCD1}">
-              <a14:hiddenFill xmlns:a14="http://schemas.microsoft.com/office/drawing/2010/main">
-                <a:solidFill>
-                  <a:srgbClr val="FFFFFF"/>
-                </a:solidFill>
-              </a14:hiddenFill>
-            </a:ext>
-          </a:extLst>
-        </p:spPr>
-      </p:pic>
-      <p:grpSp>
-        <p:nvGrpSpPr>
-          <p:cNvPr id="6" name="Group 5">
-            <a:extLst>
-              <a:ext uri="{FF2B5EF4-FFF2-40B4-BE49-F238E27FC236}">
-                <a16:creationId xmlns:a16="http://schemas.microsoft.com/office/drawing/2014/main" id="{E4E6E3E5-2FD3-48C8-81A6-6B5D84CC8064}"/>
-              </a:ext>
-            </a:extLst>
-          </p:cNvPr>
-          <p:cNvGrpSpPr/>
-          <p:nvPr/>
-        </p:nvGrpSpPr>
-        <p:grpSpPr>
-          <a:xfrm>
-            <a:off x="229773" y="1568687"/>
-            <a:ext cx="2437227" cy="2310855"/>
-            <a:chOff x="324556" y="1518080"/>
-            <a:chExt cx="3436985" cy="3415825"/>
-          </a:xfrm>
-        </p:grpSpPr>
-        <p:pic>
-          <p:nvPicPr>
-            <p:cNvPr id="4100" name="Picture 4" descr="Image result for forest symbol png">
-              <a:extLst>
-                <a:ext uri="{FF2B5EF4-FFF2-40B4-BE49-F238E27FC236}">
-                  <a16:creationId xmlns:a16="http://schemas.microsoft.com/office/drawing/2014/main" id="{136B2E71-14C6-4E65-9F24-08402B052396}"/>
-                </a:ext>
-              </a:extLst>
-            </p:cNvPr>
-            <p:cNvPicPr>
-              <a:picLocks noChangeAspect="1" noChangeArrowheads="1"/>
-            </p:cNvPicPr>
-            <p:nvPr/>
-          </p:nvPicPr>
-          <p:blipFill>
-            <a:blip r:embed="rId3">
-              <a:duotone>
-                <a:schemeClr val="bg2">
-                  <a:shade val="45000"/>
-                  <a:satMod val="135000"/>
-                </a:schemeClr>
-                <a:prstClr val="white"/>
-              </a:duotone>
-              <a:extLst>
-                <a:ext uri="{28A0092B-C50C-407E-A947-70E740481C1C}">
-                  <a14:useLocalDpi xmlns:a14="http://schemas.microsoft.com/office/drawing/2010/main" val="0"/>
-                </a:ext>
-              </a:extLst>
-            </a:blip>
-            <a:srcRect/>
-            <a:stretch>
-              <a:fillRect/>
-            </a:stretch>
-          </p:blipFill>
-          <p:spPr bwMode="auto">
-            <a:xfrm>
-              <a:off x="580008" y="1518080"/>
-              <a:ext cx="3175247" cy="3175247"/>
-            </a:xfrm>
-            <a:prstGeom prst="rect">
-              <a:avLst/>
-            </a:prstGeom>
-            <a:noFill/>
-            <a:extLst>
-              <a:ext uri="{909E8E84-426E-40DD-AFC4-6F175D3DCCD1}">
-                <a14:hiddenFill xmlns:a14="http://schemas.microsoft.com/office/drawing/2010/main">
-                  <a:solidFill>
-                    <a:srgbClr val="FFFFFF"/>
-                  </a:solidFill>
-                </a14:hiddenFill>
-              </a:ext>
-            </a:extLst>
-          </p:spPr>
-        </p:pic>
-        <p:pic>
-          <p:nvPicPr>
-            <p:cNvPr id="24" name="Picture 4" descr="Image result for forest symbol png">
-              <a:extLst>
-                <a:ext uri="{FF2B5EF4-FFF2-40B4-BE49-F238E27FC236}">
-                  <a16:creationId xmlns:a16="http://schemas.microsoft.com/office/drawing/2014/main" id="{46463490-8A17-4D9A-BFF9-5FB00CB5A302}"/>
-                </a:ext>
-              </a:extLst>
-            </p:cNvPr>
-            <p:cNvPicPr>
-              <a:picLocks noChangeAspect="1" noChangeArrowheads="1"/>
-            </p:cNvPicPr>
-            <p:nvPr/>
-          </p:nvPicPr>
-          <p:blipFill>
-            <a:blip r:embed="rId3">
-              <a:duotone>
-                <a:schemeClr val="accent3">
-                  <a:shade val="45000"/>
-                  <a:satMod val="135000"/>
-                </a:schemeClr>
-                <a:prstClr val="white"/>
-              </a:duotone>
-              <a:extLst>
-                <a:ext uri="{28A0092B-C50C-407E-A947-70E740481C1C}">
-                  <a14:useLocalDpi xmlns:a14="http://schemas.microsoft.com/office/drawing/2010/main" val="0"/>
-                </a:ext>
-              </a:extLst>
-            </a:blip>
-            <a:srcRect/>
-            <a:stretch>
-              <a:fillRect/>
-            </a:stretch>
-          </p:blipFill>
-          <p:spPr bwMode="auto">
-            <a:xfrm>
-              <a:off x="1439662" y="2574524"/>
-              <a:ext cx="2321879" cy="2321879"/>
-            </a:xfrm>
-            <a:prstGeom prst="rect">
-              <a:avLst/>
-            </a:prstGeom>
-            <a:noFill/>
-            <a:extLst>
-              <a:ext uri="{909E8E84-426E-40DD-AFC4-6F175D3DCCD1}">
-                <a14:hiddenFill xmlns:a14="http://schemas.microsoft.com/office/drawing/2010/main">
-                  <a:solidFill>
-                    <a:srgbClr val="FFFFFF"/>
-                  </a:solidFill>
-                </a14:hiddenFill>
-              </a:ext>
-            </a:extLst>
-          </p:spPr>
-        </p:pic>
-        <p:pic>
-          <p:nvPicPr>
-            <p:cNvPr id="25" name="Picture 4" descr="Image result for forest symbol png">
-              <a:extLst>
-                <a:ext uri="{FF2B5EF4-FFF2-40B4-BE49-F238E27FC236}">
-                  <a16:creationId xmlns:a16="http://schemas.microsoft.com/office/drawing/2014/main" id="{211FD4B7-4EBF-431E-9906-429E7CAA63D0}"/>
-                </a:ext>
-              </a:extLst>
-            </p:cNvPr>
-            <p:cNvPicPr>
-              <a:picLocks noChangeAspect="1" noChangeArrowheads="1"/>
-            </p:cNvPicPr>
-            <p:nvPr/>
-          </p:nvPicPr>
-          <p:blipFill>
-            <a:blip r:embed="rId3">
-              <a:lum bright="70000" contrast="-70000"/>
-              <a:extLst>
-                <a:ext uri="{28A0092B-C50C-407E-A947-70E740481C1C}">
-                  <a14:useLocalDpi xmlns:a14="http://schemas.microsoft.com/office/drawing/2010/main" val="0"/>
-                </a:ext>
-              </a:extLst>
-            </a:blip>
-            <a:srcRect/>
-            <a:stretch>
-              <a:fillRect/>
-            </a:stretch>
-          </p:blipFill>
-          <p:spPr bwMode="auto">
-            <a:xfrm>
-              <a:off x="324556" y="2856092"/>
-              <a:ext cx="2077813" cy="2077813"/>
-            </a:xfrm>
-            <a:prstGeom prst="rect">
-              <a:avLst/>
-            </a:prstGeom>
-            <a:noFill/>
-            <a:extLst>
-              <a:ext uri="{909E8E84-426E-40DD-AFC4-6F175D3DCCD1}">
-                <a14:hiddenFill xmlns:a14="http://schemas.microsoft.com/office/drawing/2010/main">
-                  <a:solidFill>
-                    <a:srgbClr val="FFFFFF"/>
-                  </a:solidFill>
-                </a14:hiddenFill>
-              </a:ext>
-            </a:extLst>
-          </p:spPr>
-        </p:pic>
-      </p:grpSp>
       <p:grpSp>
         <p:nvGrpSpPr>
           <p:cNvPr id="12" name="Group 11">
@@ -5788,7 +5557,7 @@
         </p:nvGrpSpPr>
         <p:grpSpPr>
           <a:xfrm rot="16200000">
-            <a:off x="2211520" y="2969289"/>
+            <a:off x="1201973" y="3155197"/>
             <a:ext cx="5040298" cy="2071606"/>
             <a:chOff x="8389398" y="2256635"/>
             <a:chExt cx="3693111" cy="1522081"/>
@@ -5829,7 +5598,7 @@
               <p:nvPr/>
             </p:nvPicPr>
             <p:blipFill>
-              <a:blip r:embed="rId3">
+              <a:blip r:embed="rId2">
                 <a:duotone>
                   <a:schemeClr val="bg2">
                     <a:shade val="45000"/>
@@ -5883,7 +5652,7 @@
               <p:nvPr/>
             </p:nvPicPr>
             <p:blipFill>
-              <a:blip r:embed="rId3">
+              <a:blip r:embed="rId2">
                 <a:duotone>
                   <a:schemeClr val="accent3">
                     <a:shade val="45000"/>
@@ -5937,7 +5706,7 @@
               <p:nvPr/>
             </p:nvPicPr>
             <p:blipFill>
-              <a:blip r:embed="rId3">
+              <a:blip r:embed="rId2">
                 <a:lum bright="70000" contrast="-70000"/>
                 <a:extLst>
                   <a:ext uri="{28A0092B-C50C-407E-A947-70E740481C1C}">
@@ -5986,7 +5755,7 @@
             <p:nvPr/>
           </p:nvPicPr>
           <p:blipFill>
-            <a:blip r:embed="rId2">
+            <a:blip r:embed="rId3">
               <a:duotone>
                 <a:schemeClr val="bg2">
                   <a:shade val="45000"/>
@@ -6303,8 +6072,8 @@
         </p:blipFill>
         <p:spPr bwMode="auto">
           <a:xfrm>
-            <a:off x="7792989" y="36251"/>
-            <a:ext cx="3240349" cy="3240349"/>
+            <a:off x="5515722" y="4563851"/>
+            <a:ext cx="1669110" cy="1669110"/>
           </a:xfrm>
           <a:prstGeom prst="rect">
             <a:avLst/>
@@ -6321,229 +6090,346 @@
           </a:extLst>
         </p:spPr>
       </p:pic>
-      <p:pic>
-        <p:nvPicPr>
-          <p:cNvPr id="4118" name="Picture 22" descr="Image result for brain symbol png">
-            <a:extLst>
-              <a:ext uri="{FF2B5EF4-FFF2-40B4-BE49-F238E27FC236}">
-                <a16:creationId xmlns:a16="http://schemas.microsoft.com/office/drawing/2014/main" id="{3FDDDBAD-3D4D-4E8B-8875-8388572BF4E5}"/>
-              </a:ext>
-            </a:extLst>
-          </p:cNvPr>
-          <p:cNvPicPr>
-            <a:picLocks noChangeAspect="1" noChangeArrowheads="1"/>
-          </p:cNvPicPr>
+      <p:grpSp>
+        <p:nvGrpSpPr>
+          <p:cNvPr id="3" name="Group 2">
+            <a:extLst>
+              <a:ext uri="{FF2B5EF4-FFF2-40B4-BE49-F238E27FC236}">
+                <a16:creationId xmlns:a16="http://schemas.microsoft.com/office/drawing/2014/main" id="{FDB199B2-7913-4965-A03E-471DE595C01B}"/>
+              </a:ext>
+            </a:extLst>
+          </p:cNvPr>
+          <p:cNvGrpSpPr/>
           <p:nvPr/>
-        </p:nvPicPr>
-        <p:blipFill>
-          <a:blip r:embed="rId5">
-            <a:duotone>
-              <a:schemeClr val="bg2">
-                <a:shade val="45000"/>
-                <a:satMod val="135000"/>
-              </a:schemeClr>
-              <a:prstClr val="white"/>
-            </a:duotone>
-            <a:alphaModFix amt="20000"/>
-            <a:extLst>
-              <a:ext uri="{28A0092B-C50C-407E-A947-70E740481C1C}">
-                <a14:useLocalDpi xmlns:a14="http://schemas.microsoft.com/office/drawing/2010/main" val="0"/>
-              </a:ext>
-            </a:extLst>
-          </a:blip>
-          <a:srcRect/>
-          <a:stretch>
-            <a:fillRect/>
-          </a:stretch>
-        </p:blipFill>
-        <p:spPr bwMode="auto">
+        </p:nvGrpSpPr>
+        <p:grpSpPr>
           <a:xfrm>
-            <a:off x="7330547" y="2839848"/>
-            <a:ext cx="4165232" cy="4165232"/>
+            <a:off x="229773" y="1484944"/>
+            <a:ext cx="2715627" cy="4962990"/>
+            <a:chOff x="229773" y="1484944"/>
+            <a:chExt cx="3913639" cy="5335730"/>
           </a:xfrm>
-          <a:prstGeom prst="rect">
-            <a:avLst/>
-          </a:prstGeom>
-          <a:noFill/>
-          <a:extLst>
-            <a:ext uri="{909E8E84-426E-40DD-AFC4-6F175D3DCCD1}">
-              <a14:hiddenFill xmlns:a14="http://schemas.microsoft.com/office/drawing/2010/main">
-                <a:solidFill>
-                  <a:srgbClr val="FFFFFF"/>
-                </a:solidFill>
-              </a14:hiddenFill>
-            </a:ext>
-          </a:extLst>
-        </p:spPr>
-      </p:pic>
-      <p:pic>
-        <p:nvPicPr>
-          <p:cNvPr id="4120" name="Picture 24" descr="Image result for book symbol png">
-            <a:extLst>
-              <a:ext uri="{FF2B5EF4-FFF2-40B4-BE49-F238E27FC236}">
-                <a16:creationId xmlns:a16="http://schemas.microsoft.com/office/drawing/2014/main" id="{EAD1E0F4-BCAF-48C4-A448-6779627518B6}"/>
-              </a:ext>
-            </a:extLst>
-          </p:cNvPr>
-          <p:cNvPicPr>
-            <a:picLocks noChangeAspect="1" noChangeArrowheads="1"/>
-          </p:cNvPicPr>
-          <p:nvPr/>
-        </p:nvPicPr>
-        <p:blipFill>
-          <a:blip r:embed="rId6">
-            <a:duotone>
-              <a:schemeClr val="accent5">
-                <a:shade val="45000"/>
-                <a:satMod val="135000"/>
-              </a:schemeClr>
-              <a:prstClr val="white"/>
-            </a:duotone>
-            <a:extLst>
-              <a:ext uri="{28A0092B-C50C-407E-A947-70E740481C1C}">
-                <a14:useLocalDpi xmlns:a14="http://schemas.microsoft.com/office/drawing/2010/main" val="0"/>
-              </a:ext>
-            </a:extLst>
-          </a:blip>
-          <a:srcRect/>
-          <a:stretch>
-            <a:fillRect/>
-          </a:stretch>
-        </p:blipFill>
-        <p:spPr bwMode="auto">
-          <a:xfrm>
-            <a:off x="7087351" y="3630693"/>
-            <a:ext cx="1867514" cy="1867514"/>
-          </a:xfrm>
-          <a:prstGeom prst="rect">
-            <a:avLst/>
-          </a:prstGeom>
-          <a:noFill/>
-          <a:extLst>
-            <a:ext uri="{909E8E84-426E-40DD-AFC4-6F175D3DCCD1}">
-              <a14:hiddenFill xmlns:a14="http://schemas.microsoft.com/office/drawing/2010/main">
-                <a:solidFill>
-                  <a:srgbClr val="FFFFFF"/>
-                </a:solidFill>
-              </a14:hiddenFill>
-            </a:ext>
-          </a:extLst>
-        </p:spPr>
-      </p:pic>
-      <p:sp>
-        <p:nvSpPr>
-          <p:cNvPr id="41" name="Plus Sign 40">
-            <a:extLst>
-              <a:ext uri="{FF2B5EF4-FFF2-40B4-BE49-F238E27FC236}">
-                <a16:creationId xmlns:a16="http://schemas.microsoft.com/office/drawing/2014/main" id="{2F50CE4E-A238-451B-A808-2AE856C1EE93}"/>
-              </a:ext>
-            </a:extLst>
-          </p:cNvPr>
-          <p:cNvSpPr/>
-          <p:nvPr/>
-        </p:nvSpPr>
-        <p:spPr>
-          <a:xfrm rot="16200000">
-            <a:off x="8851168" y="4012865"/>
-            <a:ext cx="1123991" cy="1231834"/>
-          </a:xfrm>
-          <a:prstGeom prst="mathPlus">
-            <a:avLst/>
-          </a:prstGeom>
-          <a:solidFill>
-            <a:schemeClr val="bg1">
-              <a:lumMod val="65000"/>
-            </a:schemeClr>
-          </a:solidFill>
-          <a:ln>
+        </p:grpSpPr>
+        <p:pic>
+          <p:nvPicPr>
+            <p:cNvPr id="4108" name="Picture 12" descr="Image result for network symbol png">
+              <a:extLst>
+                <a:ext uri="{FF2B5EF4-FFF2-40B4-BE49-F238E27FC236}">
+                  <a16:creationId xmlns:a16="http://schemas.microsoft.com/office/drawing/2014/main" id="{742DE90A-8EB3-46B4-A533-CFA3370062C1}"/>
+                </a:ext>
+              </a:extLst>
+            </p:cNvPr>
+            <p:cNvPicPr>
+              <a:picLocks noChangeAspect="1" noChangeArrowheads="1"/>
+            </p:cNvPicPr>
+            <p:nvPr/>
+          </p:nvPicPr>
+          <p:blipFill>
+            <a:blip r:embed="rId3">
+              <a:duotone>
+                <a:schemeClr val="bg2">
+                  <a:shade val="45000"/>
+                  <a:satMod val="135000"/>
+                </a:schemeClr>
+                <a:prstClr val="white"/>
+              </a:duotone>
+              <a:extLst>
+                <a:ext uri="{28A0092B-C50C-407E-A947-70E740481C1C}">
+                  <a14:useLocalDpi xmlns:a14="http://schemas.microsoft.com/office/drawing/2010/main" val="0"/>
+                </a:ext>
+              </a:extLst>
+            </a:blip>
+            <a:srcRect/>
+            <a:stretch>
+              <a:fillRect/>
+            </a:stretch>
+          </p:blipFill>
+          <p:spPr bwMode="auto">
+            <a:xfrm>
+              <a:off x="253084" y="4314548"/>
+              <a:ext cx="2894046" cy="2506126"/>
+            </a:xfrm>
+            <a:prstGeom prst="rect">
+              <a:avLst/>
+            </a:prstGeom>
             <a:noFill/>
-          </a:ln>
-        </p:spPr>
-        <p:style>
-          <a:lnRef idx="2">
-            <a:schemeClr val="accent1">
-              <a:shade val="50000"/>
-            </a:schemeClr>
-          </a:lnRef>
-          <a:fillRef idx="1">
-            <a:schemeClr val="accent1"/>
-          </a:fillRef>
-          <a:effectRef idx="0">
-            <a:schemeClr val="accent1"/>
-          </a:effectRef>
-          <a:fontRef idx="minor">
-            <a:schemeClr val="lt1"/>
-          </a:fontRef>
-        </p:style>
-        <p:txBody>
-          <a:bodyPr rtlCol="0" anchor="ctr"/>
-          <a:lstStyle/>
-          <a:p>
-            <a:pPr algn="ctr"/>
-            <a:endParaRPr lang="en-IN" dirty="0"/>
-          </a:p>
-        </p:txBody>
-      </p:sp>
-      <p:pic>
-        <p:nvPicPr>
-          <p:cNvPr id="4122" name="Picture 26" descr="Image result for instance symbol png">
-            <a:extLst>
-              <a:ext uri="{FF2B5EF4-FFF2-40B4-BE49-F238E27FC236}">
-                <a16:creationId xmlns:a16="http://schemas.microsoft.com/office/drawing/2014/main" id="{E87E189A-CCB5-43A2-98F1-B640F2E03AB4}"/>
-              </a:ext>
-            </a:extLst>
-          </p:cNvPr>
-          <p:cNvPicPr>
-            <a:picLocks noChangeAspect="1" noChangeArrowheads="1"/>
-          </p:cNvPicPr>
-          <p:nvPr/>
-        </p:nvPicPr>
-        <p:blipFill>
-          <a:blip r:embed="rId7">
-            <a:duotone>
-              <a:schemeClr val="accent4">
-                <a:shade val="45000"/>
-                <a:satMod val="135000"/>
-              </a:schemeClr>
-              <a:prstClr val="white"/>
-            </a:duotone>
-            <a:extLst>
-              <a:ext uri="{28A0092B-C50C-407E-A947-70E740481C1C}">
-                <a14:useLocalDpi xmlns:a14="http://schemas.microsoft.com/office/drawing/2010/main" val="0"/>
-              </a:ext>
-            </a:extLst>
-          </a:blip>
-          <a:srcRect/>
-          <a:stretch>
-            <a:fillRect/>
-          </a:stretch>
-        </p:blipFill>
-        <p:spPr bwMode="auto">
-          <a:xfrm>
-            <a:off x="9880587" y="3552651"/>
-            <a:ext cx="2152262" cy="2152262"/>
-          </a:xfrm>
-          <a:prstGeom prst="rect">
-            <a:avLst/>
-          </a:prstGeom>
-          <a:noFill/>
-          <a:extLst>
-            <a:ext uri="{909E8E84-426E-40DD-AFC4-6F175D3DCCD1}">
-              <a14:hiddenFill xmlns:a14="http://schemas.microsoft.com/office/drawing/2010/main">
-                <a:solidFill>
-                  <a:srgbClr val="FFFFFF"/>
-                </a:solidFill>
-              </a14:hiddenFill>
-            </a:ext>
-          </a:extLst>
-        </p:spPr>
-      </p:pic>
-      <p:sp>
-        <p:nvSpPr>
-          <p:cNvPr id="43" name="TextBox 42">
-            <a:extLst>
-              <a:ext uri="{FF2B5EF4-FFF2-40B4-BE49-F238E27FC236}">
-                <a16:creationId xmlns:a16="http://schemas.microsoft.com/office/drawing/2014/main" id="{B8B906CE-9C11-4CFA-BD92-CCDAA5D47CAA}"/>
+            <a:extLst>
+              <a:ext uri="{909E8E84-426E-40DD-AFC4-6F175D3DCCD1}">
+                <a14:hiddenFill xmlns:a14="http://schemas.microsoft.com/office/drawing/2010/main">
+                  <a:solidFill>
+                    <a:srgbClr val="FFFFFF"/>
+                  </a:solidFill>
+                </a14:hiddenFill>
+              </a:ext>
+            </a:extLst>
+          </p:spPr>
+        </p:pic>
+        <p:grpSp>
+          <p:nvGrpSpPr>
+            <p:cNvPr id="6" name="Group 5">
+              <a:extLst>
+                <a:ext uri="{FF2B5EF4-FFF2-40B4-BE49-F238E27FC236}">
+                  <a16:creationId xmlns:a16="http://schemas.microsoft.com/office/drawing/2014/main" id="{E4E6E3E5-2FD3-48C8-81A6-6B5D84CC8064}"/>
+                </a:ext>
+              </a:extLst>
+            </p:cNvPr>
+            <p:cNvGrpSpPr/>
+            <p:nvPr/>
+          </p:nvGrpSpPr>
+          <p:grpSpPr>
+            <a:xfrm>
+              <a:off x="229773" y="1568687"/>
+              <a:ext cx="2437227" cy="2310855"/>
+              <a:chOff x="324556" y="1518080"/>
+              <a:chExt cx="3436985" cy="3415825"/>
+            </a:xfrm>
+          </p:grpSpPr>
+          <p:pic>
+            <p:nvPicPr>
+              <p:cNvPr id="4100" name="Picture 4" descr="Image result for forest symbol png">
+                <a:extLst>
+                  <a:ext uri="{FF2B5EF4-FFF2-40B4-BE49-F238E27FC236}">
+                    <a16:creationId xmlns:a16="http://schemas.microsoft.com/office/drawing/2014/main" id="{136B2E71-14C6-4E65-9F24-08402B052396}"/>
+                  </a:ext>
+                </a:extLst>
+              </p:cNvPr>
+              <p:cNvPicPr>
+                <a:picLocks noChangeAspect="1" noChangeArrowheads="1"/>
+              </p:cNvPicPr>
+              <p:nvPr/>
+            </p:nvPicPr>
+            <p:blipFill>
+              <a:blip r:embed="rId2">
+                <a:duotone>
+                  <a:schemeClr val="bg2">
+                    <a:shade val="45000"/>
+                    <a:satMod val="135000"/>
+                  </a:schemeClr>
+                  <a:prstClr val="white"/>
+                </a:duotone>
+                <a:extLst>
+                  <a:ext uri="{28A0092B-C50C-407E-A947-70E740481C1C}">
+                    <a14:useLocalDpi xmlns:a14="http://schemas.microsoft.com/office/drawing/2010/main" val="0"/>
+                  </a:ext>
+                </a:extLst>
+              </a:blip>
+              <a:srcRect/>
+              <a:stretch>
+                <a:fillRect/>
+              </a:stretch>
+            </p:blipFill>
+            <p:spPr bwMode="auto">
+              <a:xfrm>
+                <a:off x="580008" y="1518080"/>
+                <a:ext cx="3175247" cy="3175247"/>
+              </a:xfrm>
+              <a:prstGeom prst="rect">
+                <a:avLst/>
+              </a:prstGeom>
+              <a:noFill/>
+              <a:extLst>
+                <a:ext uri="{909E8E84-426E-40DD-AFC4-6F175D3DCCD1}">
+                  <a14:hiddenFill xmlns:a14="http://schemas.microsoft.com/office/drawing/2010/main">
+                    <a:solidFill>
+                      <a:srgbClr val="FFFFFF"/>
+                    </a:solidFill>
+                  </a14:hiddenFill>
+                </a:ext>
+              </a:extLst>
+            </p:spPr>
+          </p:pic>
+          <p:pic>
+            <p:nvPicPr>
+              <p:cNvPr id="24" name="Picture 4" descr="Image result for forest symbol png">
+                <a:extLst>
+                  <a:ext uri="{FF2B5EF4-FFF2-40B4-BE49-F238E27FC236}">
+                    <a16:creationId xmlns:a16="http://schemas.microsoft.com/office/drawing/2014/main" id="{46463490-8A17-4D9A-BFF9-5FB00CB5A302}"/>
+                  </a:ext>
+                </a:extLst>
+              </p:cNvPr>
+              <p:cNvPicPr>
+                <a:picLocks noChangeAspect="1" noChangeArrowheads="1"/>
+              </p:cNvPicPr>
+              <p:nvPr/>
+            </p:nvPicPr>
+            <p:blipFill>
+              <a:blip r:embed="rId2">
+                <a:duotone>
+                  <a:schemeClr val="accent3">
+                    <a:shade val="45000"/>
+                    <a:satMod val="135000"/>
+                  </a:schemeClr>
+                  <a:prstClr val="white"/>
+                </a:duotone>
+                <a:extLst>
+                  <a:ext uri="{28A0092B-C50C-407E-A947-70E740481C1C}">
+                    <a14:useLocalDpi xmlns:a14="http://schemas.microsoft.com/office/drawing/2010/main" val="0"/>
+                  </a:ext>
+                </a:extLst>
+              </a:blip>
+              <a:srcRect/>
+              <a:stretch>
+                <a:fillRect/>
+              </a:stretch>
+            </p:blipFill>
+            <p:spPr bwMode="auto">
+              <a:xfrm>
+                <a:off x="1439662" y="2574524"/>
+                <a:ext cx="2321879" cy="2321879"/>
+              </a:xfrm>
+              <a:prstGeom prst="rect">
+                <a:avLst/>
+              </a:prstGeom>
+              <a:noFill/>
+              <a:extLst>
+                <a:ext uri="{909E8E84-426E-40DD-AFC4-6F175D3DCCD1}">
+                  <a14:hiddenFill xmlns:a14="http://schemas.microsoft.com/office/drawing/2010/main">
+                    <a:solidFill>
+                      <a:srgbClr val="FFFFFF"/>
+                    </a:solidFill>
+                  </a14:hiddenFill>
+                </a:ext>
+              </a:extLst>
+            </p:spPr>
+          </p:pic>
+          <p:pic>
+            <p:nvPicPr>
+              <p:cNvPr id="25" name="Picture 4" descr="Image result for forest symbol png">
+                <a:extLst>
+                  <a:ext uri="{FF2B5EF4-FFF2-40B4-BE49-F238E27FC236}">
+                    <a16:creationId xmlns:a16="http://schemas.microsoft.com/office/drawing/2014/main" id="{211FD4B7-4EBF-431E-9906-429E7CAA63D0}"/>
+                  </a:ext>
+                </a:extLst>
+              </p:cNvPr>
+              <p:cNvPicPr>
+                <a:picLocks noChangeAspect="1" noChangeArrowheads="1"/>
+              </p:cNvPicPr>
+              <p:nvPr/>
+            </p:nvPicPr>
+            <p:blipFill>
+              <a:blip r:embed="rId2">
+                <a:lum bright="70000" contrast="-70000"/>
+                <a:extLst>
+                  <a:ext uri="{28A0092B-C50C-407E-A947-70E740481C1C}">
+                    <a14:useLocalDpi xmlns:a14="http://schemas.microsoft.com/office/drawing/2010/main" val="0"/>
+                  </a:ext>
+                </a:extLst>
+              </a:blip>
+              <a:srcRect/>
+              <a:stretch>
+                <a:fillRect/>
+              </a:stretch>
+            </p:blipFill>
+            <p:spPr bwMode="auto">
+              <a:xfrm>
+                <a:off x="324556" y="2856092"/>
+                <a:ext cx="2077813" cy="2077813"/>
+              </a:xfrm>
+              <a:prstGeom prst="rect">
+                <a:avLst/>
+              </a:prstGeom>
+              <a:noFill/>
+              <a:extLst>
+                <a:ext uri="{909E8E84-426E-40DD-AFC4-6F175D3DCCD1}">
+                  <a14:hiddenFill xmlns:a14="http://schemas.microsoft.com/office/drawing/2010/main">
+                    <a:solidFill>
+                      <a:srgbClr val="FFFFFF"/>
+                    </a:solidFill>
+                  </a14:hiddenFill>
+                </a:ext>
+              </a:extLst>
+            </p:spPr>
+          </p:pic>
+        </p:grpSp>
+        <p:sp>
+          <p:nvSpPr>
+            <p:cNvPr id="43" name="TextBox 42">
+              <a:extLst>
+                <a:ext uri="{FF2B5EF4-FFF2-40B4-BE49-F238E27FC236}">
+                  <a16:creationId xmlns:a16="http://schemas.microsoft.com/office/drawing/2014/main" id="{B8B906CE-9C11-4CFA-BD92-CCDAA5D47CAA}"/>
+                </a:ext>
+              </a:extLst>
+            </p:cNvPr>
+            <p:cNvSpPr txBox="1"/>
+            <p:nvPr/>
+          </p:nvSpPr>
+          <p:spPr>
+            <a:xfrm>
+              <a:off x="2099553" y="1484944"/>
+              <a:ext cx="2043859" cy="430160"/>
+            </a:xfrm>
+            <a:prstGeom prst="rect">
+              <a:avLst/>
+            </a:prstGeom>
+            <a:noFill/>
+          </p:spPr>
+          <p:txBody>
+            <a:bodyPr wrap="square" rtlCol="0">
+              <a:spAutoFit/>
+            </a:bodyPr>
+            <a:lstStyle/>
+            <a:p>
+              <a:r>
+                <a:rPr lang="en-IN" sz="2000" b="1" dirty="0">
+                  <a:solidFill>
+                    <a:schemeClr val="bg1">
+                      <a:lumMod val="75000"/>
+                    </a:schemeClr>
+                  </a:solidFill>
+                </a:rPr>
+                <a:t>Ensemble</a:t>
+              </a:r>
+            </a:p>
+          </p:txBody>
+        </p:sp>
+        <p:sp>
+          <p:nvSpPr>
+            <p:cNvPr id="44" name="TextBox 43">
+              <a:extLst>
+                <a:ext uri="{FF2B5EF4-FFF2-40B4-BE49-F238E27FC236}">
+                  <a16:creationId xmlns:a16="http://schemas.microsoft.com/office/drawing/2014/main" id="{E36509C2-E7B0-4E59-8D44-B5CE4A6D9634}"/>
+                </a:ext>
+              </a:extLst>
+            </p:cNvPr>
+            <p:cNvSpPr txBox="1"/>
+            <p:nvPr/>
+          </p:nvSpPr>
+          <p:spPr>
+            <a:xfrm>
+              <a:off x="2136208" y="3914438"/>
+              <a:ext cx="1418209" cy="400110"/>
+            </a:xfrm>
+            <a:prstGeom prst="rect">
+              <a:avLst/>
+            </a:prstGeom>
+            <a:noFill/>
+          </p:spPr>
+          <p:txBody>
+            <a:bodyPr wrap="square" rtlCol="0">
+              <a:spAutoFit/>
+            </a:bodyPr>
+            <a:lstStyle/>
+            <a:p>
+              <a:r>
+                <a:rPr lang="en-IN" sz="2000" b="1" dirty="0">
+                  <a:solidFill>
+                    <a:schemeClr val="bg1">
+                      <a:lumMod val="75000"/>
+                    </a:schemeClr>
+                  </a:solidFill>
+                </a:rPr>
+                <a:t>KNN</a:t>
+              </a:r>
+            </a:p>
+          </p:txBody>
+        </p:sp>
+      </p:grpSp>
+      <p:sp>
+        <p:nvSpPr>
+          <p:cNvPr id="45" name="TextBox 44">
+            <a:extLst>
+              <a:ext uri="{FF2B5EF4-FFF2-40B4-BE49-F238E27FC236}">
+                <a16:creationId xmlns:a16="http://schemas.microsoft.com/office/drawing/2014/main" id="{83F132ED-5DFB-4EAE-BA55-F5D0CFEEF1B0}"/>
               </a:ext>
             </a:extLst>
           </p:cNvPr>
@@ -6552,89 +6438,7 @@
         </p:nvSpPr>
         <p:spPr>
           <a:xfrm>
-            <a:off x="2099554" y="1484943"/>
-            <a:ext cx="1418209" cy="400110"/>
-          </a:xfrm>
-          <a:prstGeom prst="rect">
-            <a:avLst/>
-          </a:prstGeom>
-          <a:noFill/>
-        </p:spPr>
-        <p:txBody>
-          <a:bodyPr wrap="square" rtlCol="0">
-            <a:spAutoFit/>
-          </a:bodyPr>
-          <a:lstStyle/>
-          <a:p>
-            <a:r>
-              <a:rPr lang="en-IN" sz="2000" b="1" dirty="0">
-                <a:solidFill>
-                  <a:schemeClr val="bg1">
-                    <a:lumMod val="75000"/>
-                  </a:schemeClr>
-                </a:solidFill>
-              </a:rPr>
-              <a:t>Ensemble</a:t>
-            </a:r>
-          </a:p>
-        </p:txBody>
-      </p:sp>
-      <p:sp>
-        <p:nvSpPr>
-          <p:cNvPr id="44" name="TextBox 43">
-            <a:extLst>
-              <a:ext uri="{FF2B5EF4-FFF2-40B4-BE49-F238E27FC236}">
-                <a16:creationId xmlns:a16="http://schemas.microsoft.com/office/drawing/2014/main" id="{E36509C2-E7B0-4E59-8D44-B5CE4A6D9634}"/>
-              </a:ext>
-            </a:extLst>
-          </p:cNvPr>
-          <p:cNvSpPr txBox="1"/>
-          <p:nvPr/>
-        </p:nvSpPr>
-        <p:spPr>
-          <a:xfrm>
-            <a:off x="2136208" y="3914438"/>
-            <a:ext cx="1418209" cy="400110"/>
-          </a:xfrm>
-          <a:prstGeom prst="rect">
-            <a:avLst/>
-          </a:prstGeom>
-          <a:noFill/>
-        </p:spPr>
-        <p:txBody>
-          <a:bodyPr wrap="square" rtlCol="0">
-            <a:spAutoFit/>
-          </a:bodyPr>
-          <a:lstStyle/>
-          <a:p>
-            <a:r>
-              <a:rPr lang="en-IN" sz="2000" b="1" dirty="0">
-                <a:solidFill>
-                  <a:schemeClr val="bg1">
-                    <a:lumMod val="75000"/>
-                  </a:schemeClr>
-                </a:solidFill>
-              </a:rPr>
-              <a:t>KNN</a:t>
-            </a:r>
-          </a:p>
-        </p:txBody>
-      </p:sp>
-      <p:sp>
-        <p:nvSpPr>
-          <p:cNvPr id="45" name="TextBox 44">
-            <a:extLst>
-              <a:ext uri="{FF2B5EF4-FFF2-40B4-BE49-F238E27FC236}">
-                <a16:creationId xmlns:a16="http://schemas.microsoft.com/office/drawing/2014/main" id="{83F132ED-5DFB-4EAE-BA55-F5D0CFEEF1B0}"/>
-              </a:ext>
-            </a:extLst>
-          </p:cNvPr>
-          <p:cNvSpPr txBox="1"/>
-          <p:nvPr/>
-        </p:nvSpPr>
-        <p:spPr>
-          <a:xfrm>
-            <a:off x="4099778" y="1480327"/>
+            <a:off x="3101034" y="1480453"/>
             <a:ext cx="1418209" cy="400110"/>
           </a:xfrm>
           <a:prstGeom prst="rect">
@@ -6661,96 +6465,453 @@
           </a:p>
         </p:txBody>
       </p:sp>
-      <p:sp>
-        <p:nvSpPr>
-          <p:cNvPr id="46" name="TextBox 45">
-            <a:extLst>
-              <a:ext uri="{FF2B5EF4-FFF2-40B4-BE49-F238E27FC236}">
-                <a16:creationId xmlns:a16="http://schemas.microsoft.com/office/drawing/2014/main" id="{3A729396-2934-4CAB-BF88-51F284ECB35B}"/>
-              </a:ext>
-            </a:extLst>
-          </p:cNvPr>
-          <p:cNvSpPr txBox="1"/>
+      <p:grpSp>
+        <p:nvGrpSpPr>
+          <p:cNvPr id="8" name="Group 7">
+            <a:extLst>
+              <a:ext uri="{FF2B5EF4-FFF2-40B4-BE49-F238E27FC236}">
+                <a16:creationId xmlns:a16="http://schemas.microsoft.com/office/drawing/2014/main" id="{47771DA2-7C42-43E4-ADAA-555B4CEBF383}"/>
+              </a:ext>
+            </a:extLst>
+          </p:cNvPr>
+          <p:cNvGrpSpPr/>
+          <p:nvPr/>
+        </p:nvGrpSpPr>
+        <p:grpSpPr>
+          <a:xfrm>
+            <a:off x="7875759" y="3793275"/>
+            <a:ext cx="4331609" cy="2978262"/>
+            <a:chOff x="7087351" y="2839848"/>
+            <a:chExt cx="5751038" cy="4165232"/>
+          </a:xfrm>
+        </p:grpSpPr>
+        <p:pic>
+          <p:nvPicPr>
+            <p:cNvPr id="4118" name="Picture 22" descr="Image result for brain symbol png">
+              <a:extLst>
+                <a:ext uri="{FF2B5EF4-FFF2-40B4-BE49-F238E27FC236}">
+                  <a16:creationId xmlns:a16="http://schemas.microsoft.com/office/drawing/2014/main" id="{3FDDDBAD-3D4D-4E8B-8875-8388572BF4E5}"/>
+                </a:ext>
+              </a:extLst>
+            </p:cNvPr>
+            <p:cNvPicPr>
+              <a:picLocks noChangeAspect="1" noChangeArrowheads="1"/>
+            </p:cNvPicPr>
+            <p:nvPr/>
+          </p:nvPicPr>
+          <p:blipFill>
+            <a:blip r:embed="rId5">
+              <a:duotone>
+                <a:schemeClr val="bg2">
+                  <a:shade val="45000"/>
+                  <a:satMod val="135000"/>
+                </a:schemeClr>
+                <a:prstClr val="white"/>
+              </a:duotone>
+              <a:alphaModFix amt="20000"/>
+              <a:extLst>
+                <a:ext uri="{28A0092B-C50C-407E-A947-70E740481C1C}">
+                  <a14:useLocalDpi xmlns:a14="http://schemas.microsoft.com/office/drawing/2010/main" val="0"/>
+                </a:ext>
+              </a:extLst>
+            </a:blip>
+            <a:srcRect/>
+            <a:stretch>
+              <a:fillRect/>
+            </a:stretch>
+          </p:blipFill>
+          <p:spPr bwMode="auto">
+            <a:xfrm>
+              <a:off x="7330547" y="2839848"/>
+              <a:ext cx="4165232" cy="4165232"/>
+            </a:xfrm>
+            <a:prstGeom prst="rect">
+              <a:avLst/>
+            </a:prstGeom>
+            <a:noFill/>
+            <a:extLst>
+              <a:ext uri="{909E8E84-426E-40DD-AFC4-6F175D3DCCD1}">
+                <a14:hiddenFill xmlns:a14="http://schemas.microsoft.com/office/drawing/2010/main">
+                  <a:solidFill>
+                    <a:srgbClr val="FFFFFF"/>
+                  </a:solidFill>
+                </a14:hiddenFill>
+              </a:ext>
+            </a:extLst>
+          </p:spPr>
+        </p:pic>
+        <p:pic>
+          <p:nvPicPr>
+            <p:cNvPr id="4120" name="Picture 24" descr="Image result for book symbol png">
+              <a:extLst>
+                <a:ext uri="{FF2B5EF4-FFF2-40B4-BE49-F238E27FC236}">
+                  <a16:creationId xmlns:a16="http://schemas.microsoft.com/office/drawing/2014/main" id="{EAD1E0F4-BCAF-48C4-A448-6779627518B6}"/>
+                </a:ext>
+              </a:extLst>
+            </p:cNvPr>
+            <p:cNvPicPr>
+              <a:picLocks noChangeAspect="1" noChangeArrowheads="1"/>
+            </p:cNvPicPr>
+            <p:nvPr/>
+          </p:nvPicPr>
+          <p:blipFill>
+            <a:blip r:embed="rId6">
+              <a:duotone>
+                <a:schemeClr val="accent5">
+                  <a:shade val="45000"/>
+                  <a:satMod val="135000"/>
+                </a:schemeClr>
+                <a:prstClr val="white"/>
+              </a:duotone>
+              <a:extLst>
+                <a:ext uri="{28A0092B-C50C-407E-A947-70E740481C1C}">
+                  <a14:useLocalDpi xmlns:a14="http://schemas.microsoft.com/office/drawing/2010/main" val="0"/>
+                </a:ext>
+              </a:extLst>
+            </a:blip>
+            <a:srcRect/>
+            <a:stretch>
+              <a:fillRect/>
+            </a:stretch>
+          </p:blipFill>
+          <p:spPr bwMode="auto">
+            <a:xfrm>
+              <a:off x="7087351" y="3630693"/>
+              <a:ext cx="1867514" cy="1867514"/>
+            </a:xfrm>
+            <a:prstGeom prst="rect">
+              <a:avLst/>
+            </a:prstGeom>
+            <a:noFill/>
+            <a:extLst>
+              <a:ext uri="{909E8E84-426E-40DD-AFC4-6F175D3DCCD1}">
+                <a14:hiddenFill xmlns:a14="http://schemas.microsoft.com/office/drawing/2010/main">
+                  <a:solidFill>
+                    <a:srgbClr val="FFFFFF"/>
+                  </a:solidFill>
+                </a14:hiddenFill>
+              </a:ext>
+            </a:extLst>
+          </p:spPr>
+        </p:pic>
+        <p:sp>
+          <p:nvSpPr>
+            <p:cNvPr id="41" name="Plus Sign 40">
+              <a:extLst>
+                <a:ext uri="{FF2B5EF4-FFF2-40B4-BE49-F238E27FC236}">
+                  <a16:creationId xmlns:a16="http://schemas.microsoft.com/office/drawing/2014/main" id="{2F50CE4E-A238-451B-A808-2AE856C1EE93}"/>
+                </a:ext>
+              </a:extLst>
+            </p:cNvPr>
+            <p:cNvSpPr/>
+            <p:nvPr/>
+          </p:nvSpPr>
+          <p:spPr>
+            <a:xfrm rot="16200000">
+              <a:off x="8851168" y="4012865"/>
+              <a:ext cx="1123991" cy="1231834"/>
+            </a:xfrm>
+            <a:prstGeom prst="mathPlus">
+              <a:avLst/>
+            </a:prstGeom>
+            <a:solidFill>
+              <a:schemeClr val="bg1">
+                <a:lumMod val="65000"/>
+              </a:schemeClr>
+            </a:solidFill>
+            <a:ln>
+              <a:noFill/>
+            </a:ln>
+          </p:spPr>
+          <p:style>
+            <a:lnRef idx="2">
+              <a:schemeClr val="accent1">
+                <a:shade val="50000"/>
+              </a:schemeClr>
+            </a:lnRef>
+            <a:fillRef idx="1">
+              <a:schemeClr val="accent1"/>
+            </a:fillRef>
+            <a:effectRef idx="0">
+              <a:schemeClr val="accent1"/>
+            </a:effectRef>
+            <a:fontRef idx="minor">
+              <a:schemeClr val="lt1"/>
+            </a:fontRef>
+          </p:style>
+          <p:txBody>
+            <a:bodyPr rtlCol="0" anchor="ctr"/>
+            <a:lstStyle/>
+            <a:p>
+              <a:pPr algn="ctr"/>
+              <a:endParaRPr lang="en-IN" dirty="0"/>
+            </a:p>
+          </p:txBody>
+        </p:sp>
+        <p:pic>
+          <p:nvPicPr>
+            <p:cNvPr id="4122" name="Picture 26" descr="Image result for instance symbol png">
+              <a:extLst>
+                <a:ext uri="{FF2B5EF4-FFF2-40B4-BE49-F238E27FC236}">
+                  <a16:creationId xmlns:a16="http://schemas.microsoft.com/office/drawing/2014/main" id="{E87E189A-CCB5-43A2-98F1-B640F2E03AB4}"/>
+                </a:ext>
+              </a:extLst>
+            </p:cNvPr>
+            <p:cNvPicPr>
+              <a:picLocks noChangeAspect="1" noChangeArrowheads="1"/>
+            </p:cNvPicPr>
+            <p:nvPr/>
+          </p:nvPicPr>
+          <p:blipFill>
+            <a:blip r:embed="rId7">
+              <a:duotone>
+                <a:schemeClr val="accent4">
+                  <a:shade val="45000"/>
+                  <a:satMod val="135000"/>
+                </a:schemeClr>
+                <a:prstClr val="white"/>
+              </a:duotone>
+              <a:extLst>
+                <a:ext uri="{28A0092B-C50C-407E-A947-70E740481C1C}">
+                  <a14:useLocalDpi xmlns:a14="http://schemas.microsoft.com/office/drawing/2010/main" val="0"/>
+                </a:ext>
+              </a:extLst>
+            </a:blip>
+            <a:srcRect/>
+            <a:stretch>
+              <a:fillRect/>
+            </a:stretch>
+          </p:blipFill>
+          <p:spPr bwMode="auto">
+            <a:xfrm>
+              <a:off x="9880587" y="3552651"/>
+              <a:ext cx="2152262" cy="2152262"/>
+            </a:xfrm>
+            <a:prstGeom prst="rect">
+              <a:avLst/>
+            </a:prstGeom>
+            <a:noFill/>
+            <a:extLst>
+              <a:ext uri="{909E8E84-426E-40DD-AFC4-6F175D3DCCD1}">
+                <a14:hiddenFill xmlns:a14="http://schemas.microsoft.com/office/drawing/2010/main">
+                  <a:solidFill>
+                    <a:srgbClr val="FFFFFF"/>
+                  </a:solidFill>
+                </a14:hiddenFill>
+              </a:ext>
+            </a:extLst>
+          </p:spPr>
+        </p:pic>
+        <p:sp>
+          <p:nvSpPr>
+            <p:cNvPr id="46" name="TextBox 45">
+              <a:extLst>
+                <a:ext uri="{FF2B5EF4-FFF2-40B4-BE49-F238E27FC236}">
+                  <a16:creationId xmlns:a16="http://schemas.microsoft.com/office/drawing/2014/main" id="{3A729396-2934-4CAB-BF88-51F284ECB35B}"/>
+                </a:ext>
+              </a:extLst>
+            </p:cNvPr>
+            <p:cNvSpPr txBox="1"/>
+            <p:nvPr/>
+          </p:nvSpPr>
+          <p:spPr>
+            <a:xfrm>
+              <a:off x="7104872" y="5626870"/>
+              <a:ext cx="2066438" cy="707886"/>
+            </a:xfrm>
+            <a:prstGeom prst="rect">
+              <a:avLst/>
+            </a:prstGeom>
+            <a:noFill/>
+          </p:spPr>
+          <p:txBody>
+            <a:bodyPr wrap="square" rtlCol="0">
+              <a:spAutoFit/>
+            </a:bodyPr>
+            <a:lstStyle/>
+            <a:p>
+              <a:r>
+                <a:rPr lang="en-IN" sz="2000" b="1" dirty="0">
+                  <a:solidFill>
+                    <a:schemeClr val="bg1">
+                      <a:lumMod val="75000"/>
+                    </a:schemeClr>
+                  </a:solidFill>
+                </a:rPr>
+                <a:t>Generalized Knowledge</a:t>
+              </a:r>
+            </a:p>
+          </p:txBody>
+        </p:sp>
+        <p:sp>
+          <p:nvSpPr>
+            <p:cNvPr id="47" name="TextBox 46">
+              <a:extLst>
+                <a:ext uri="{FF2B5EF4-FFF2-40B4-BE49-F238E27FC236}">
+                  <a16:creationId xmlns:a16="http://schemas.microsoft.com/office/drawing/2014/main" id="{F64094F3-080E-4822-86C6-9F74F23F9A08}"/>
+                </a:ext>
+              </a:extLst>
+            </p:cNvPr>
+            <p:cNvSpPr txBox="1"/>
+            <p:nvPr/>
+          </p:nvSpPr>
+          <p:spPr>
+            <a:xfrm>
+              <a:off x="10690256" y="5672213"/>
+              <a:ext cx="2148133" cy="1251671"/>
+            </a:xfrm>
+            <a:prstGeom prst="rect">
+              <a:avLst/>
+            </a:prstGeom>
+            <a:noFill/>
+          </p:spPr>
+          <p:txBody>
+            <a:bodyPr wrap="square" rtlCol="0">
+              <a:spAutoFit/>
+            </a:bodyPr>
+            <a:lstStyle/>
+            <a:p>
+              <a:r>
+                <a:rPr lang="en-IN" sz="2000" b="1" dirty="0">
+                  <a:solidFill>
+                    <a:schemeClr val="bg1">
+                      <a:lumMod val="75000"/>
+                    </a:schemeClr>
+                  </a:solidFill>
+                </a:rPr>
+                <a:t>Experience/</a:t>
+              </a:r>
+            </a:p>
+            <a:p>
+              <a:r>
+                <a:rPr lang="en-IN" sz="2000" b="1" dirty="0">
+                  <a:solidFill>
+                    <a:schemeClr val="bg1">
+                      <a:lumMod val="75000"/>
+                    </a:schemeClr>
+                  </a:solidFill>
+                </a:rPr>
+                <a:t>Case-Based Knowledge</a:t>
+              </a:r>
+            </a:p>
+          </p:txBody>
+        </p:sp>
+      </p:grpSp>
+      <p:sp>
+        <p:nvSpPr>
+          <p:cNvPr id="2" name="Rectangle 1">
+            <a:extLst>
+              <a:ext uri="{FF2B5EF4-FFF2-40B4-BE49-F238E27FC236}">
+                <a16:creationId xmlns:a16="http://schemas.microsoft.com/office/drawing/2014/main" id="{5A7F2B31-9DD3-48B9-B6FB-C537B54B6653}"/>
+              </a:ext>
+            </a:extLst>
+          </p:cNvPr>
+          <p:cNvSpPr/>
           <p:nvPr/>
         </p:nvSpPr>
         <p:spPr>
           <a:xfrm>
-            <a:off x="6383883" y="3262498"/>
-            <a:ext cx="2066438" cy="707886"/>
+            <a:off x="4932445" y="168600"/>
+            <a:ext cx="7100404" cy="3970318"/>
           </a:xfrm>
           <a:prstGeom prst="rect">
             <a:avLst/>
           </a:prstGeom>
-          <a:noFill/>
         </p:spPr>
         <p:txBody>
-          <a:bodyPr wrap="square" rtlCol="0">
+          <a:bodyPr wrap="square">
             <a:spAutoFit/>
           </a:bodyPr>
           <a:lstStyle/>
           <a:p>
             <a:r>
-              <a:rPr lang="en-IN" sz="2000" b="1" dirty="0">
+              <a:rPr lang="en-IN" sz="5400" b="1" dirty="0">
                 <a:solidFill>
-                  <a:schemeClr val="bg1">
-                    <a:lumMod val="75000"/>
+                  <a:schemeClr val="accent3">
+                    <a:lumMod val="60000"/>
+                    <a:lumOff val="40000"/>
                   </a:schemeClr>
                 </a:solidFill>
               </a:rPr>
-              <a:t>Generalized Knowledge</a:t>
-            </a:r>
-          </a:p>
-        </p:txBody>
-      </p:sp>
-      <p:sp>
-        <p:nvSpPr>
-          <p:cNvPr id="47" name="TextBox 46">
-            <a:extLst>
-              <a:ext uri="{FF2B5EF4-FFF2-40B4-BE49-F238E27FC236}">
-                <a16:creationId xmlns:a16="http://schemas.microsoft.com/office/drawing/2014/main" id="{F64094F3-080E-4822-86C6-9F74F23F9A08}"/>
-              </a:ext>
-            </a:extLst>
-          </p:cNvPr>
-          <p:cNvSpPr txBox="1"/>
-          <p:nvPr/>
-        </p:nvSpPr>
-        <p:spPr>
-          <a:xfrm>
-            <a:off x="10690257" y="5672214"/>
-            <a:ext cx="1611044" cy="1015663"/>
-          </a:xfrm>
-          <a:prstGeom prst="rect">
-            <a:avLst/>
-          </a:prstGeom>
-          <a:noFill/>
-        </p:spPr>
-        <p:txBody>
-          <a:bodyPr wrap="square" rtlCol="0">
-            <a:spAutoFit/>
-          </a:bodyPr>
-          <a:lstStyle/>
-          <a:p>
-            <a:r>
-              <a:rPr lang="en-IN" sz="2000" b="1" dirty="0">
+              <a:t>Research Questions</a:t>
+            </a:r>
+          </a:p>
+          <a:p>
+            <a:endParaRPr lang="en-IN" dirty="0"/>
+          </a:p>
+          <a:p>
+            <a:r>
+              <a:rPr lang="en-IN" dirty="0">
                 <a:solidFill>
                   <a:schemeClr val="bg1">
-                    <a:lumMod val="75000"/>
+                    <a:lumMod val="85000"/>
                   </a:schemeClr>
                 </a:solidFill>
               </a:rPr>
-              <a:t>Experience/</a:t>
-            </a:r>
-          </a:p>
-          <a:p>
-            <a:r>
-              <a:rPr lang="en-IN" sz="2000" b="1" dirty="0">
+              <a:t>• What features influence the survival of the patients the most ?</a:t>
+            </a:r>
+          </a:p>
+          <a:p>
+            <a:endParaRPr lang="en-IN" dirty="0">
+              <a:solidFill>
+                <a:schemeClr val="bg1">
+                  <a:lumMod val="85000"/>
+                </a:schemeClr>
+              </a:solidFill>
+            </a:endParaRPr>
+          </a:p>
+          <a:p>
+            <a:r>
+              <a:rPr lang="en-IN" dirty="0">
                 <a:solidFill>
                   <a:schemeClr val="bg1">
-                    <a:lumMod val="75000"/>
+                    <a:lumMod val="85000"/>
                   </a:schemeClr>
                 </a:solidFill>
               </a:rPr>
-              <a:t>Case-Based Knowledge</a:t>
+              <a:t>• How does age affect patient survival ? Are older patients at higher risk irrespective of the condition?</a:t>
+            </a:r>
+          </a:p>
+          <a:p>
+            <a:endParaRPr lang="en-IN" dirty="0">
+              <a:solidFill>
+                <a:schemeClr val="bg1">
+                  <a:lumMod val="85000"/>
+                </a:schemeClr>
+              </a:solidFill>
+            </a:endParaRPr>
+          </a:p>
+          <a:p>
+            <a:r>
+              <a:rPr lang="en-IN" dirty="0">
+                <a:solidFill>
+                  <a:schemeClr val="bg1">
+                    <a:lumMod val="85000"/>
+                  </a:schemeClr>
+                </a:solidFill>
+              </a:rPr>
+              <a:t>• Is there any strong correlation between disease/Condition and the number of fatalities ?</a:t>
+            </a:r>
+          </a:p>
+          <a:p>
+            <a:endParaRPr lang="en-IN" dirty="0">
+              <a:solidFill>
+                <a:schemeClr val="bg1">
+                  <a:lumMod val="85000"/>
+                </a:schemeClr>
+              </a:solidFill>
+            </a:endParaRPr>
+          </a:p>
+          <a:p>
+            <a:r>
+              <a:rPr lang="en-IN" dirty="0">
+                <a:solidFill>
+                  <a:schemeClr val="bg1">
+                    <a:lumMod val="85000"/>
+                  </a:schemeClr>
+                </a:solidFill>
+              </a:rPr>
+              <a:t>• Is there a correlation between disease/Condition and patient  admissions and readmissions?</a:t>
             </a:r>
           </a:p>
         </p:txBody>

</xml_diff>